<commit_message>
added some images for slide contents
</commit_message>
<xml_diff>
--- a/slides/slides.pptx
+++ b/slides/slides.pptx
@@ -310,7 +310,7 @@
           <a:p>
             <a:fld id="{DC661A4A-D0C3-4623-84C2-FD4286BDBB96}" type="datetimeFigureOut">
               <a:rPr lang="it-IT" smtClean="0"/>
-              <a:t>13/03/2015</a:t>
+              <a:t>20/03/2015</a:t>
             </a:fld>
             <a:endParaRPr lang="it-IT"/>
           </a:p>
@@ -5577,15 +5577,7 @@
           <a:p>
             <a:r>
               <a:rPr lang="en-US" dirty="0" smtClean="0"/>
-              <a:t>Suitable for not persistent game world (</a:t>
-            </a:r>
-            <a:r>
-              <a:rPr lang="en-US" dirty="0" smtClean="0"/>
-              <a:t>fps, racing</a:t>
-            </a:r>
-            <a:r>
-              <a:rPr lang="en-US" dirty="0" smtClean="0"/>
-              <a:t>)</a:t>
+              <a:t>Suitable for not persistent game world (fps, racing)</a:t>
             </a:r>
           </a:p>
           <a:p>
@@ -5597,7 +5589,6 @@
               <a:rPr lang="en-US" dirty="0" smtClean="0"/>
               <a:t> to develop, easy to maintain, low costs</a:t>
             </a:r>
-            <a:endParaRPr lang="en-US" dirty="0" smtClean="0"/>
           </a:p>
         </p:txBody>
       </p:sp>
@@ -5786,7 +5777,6 @@
               <a:rPr lang="en-US" dirty="0" smtClean="0"/>
               <a:t>Hard to use in some other aspect (world consistency)</a:t>
             </a:r>
-            <a:endParaRPr lang="en-US" dirty="0" smtClean="0"/>
           </a:p>
         </p:txBody>
       </p:sp>
@@ -8984,16 +8974,26 @@
             </a:r>
             <a:r>
               <a:rPr lang="en-US" dirty="0" smtClean="0"/>
-              <a:t>: crazy slot cars</a:t>
-            </a:r>
-          </a:p>
-          <a:p>
-            <a:pPr lvl="1"/>
+              <a:t>: crazy slot </a:t>
+            </a:r>
+            <a:r>
+              <a:rPr lang="en-US" dirty="0" smtClean="0"/>
+              <a:t>cars</a:t>
+            </a:r>
+            <a:br>
+              <a:rPr lang="en-US" dirty="0" smtClean="0"/>
+            </a:br>
             <a:r>
               <a:rPr lang="en-US" dirty="0" smtClean="0">
                 <a:hlinkClick r:id="rId2"/>
               </a:rPr>
-              <a:t>http://interactiveproject.com/</a:t>
+              <a:t>http</a:t>
+            </a:r>
+            <a:r>
+              <a:rPr lang="en-US" dirty="0" smtClean="0">
+                <a:hlinkClick r:id="rId2"/>
+              </a:rPr>
+              <a:t>://interactiveproject.com/</a:t>
             </a:r>
             <a:endParaRPr lang="en-US" dirty="0" smtClean="0"/>
           </a:p>
@@ -14604,22 +14604,13 @@
           <a:p>
             <a:r>
               <a:rPr lang="en-US" dirty="0" smtClean="0"/>
-              <a:t>What is a multiplayer </a:t>
-            </a:r>
+              <a:t>What is a multiplayer game?</a:t>
+            </a:r>
+          </a:p>
+          <a:p>
             <a:r>
               <a:rPr lang="en-US" dirty="0" smtClean="0"/>
-              <a:t>game?</a:t>
-            </a:r>
-            <a:endParaRPr lang="en-US" dirty="0" smtClean="0"/>
-          </a:p>
-          <a:p>
-            <a:r>
-              <a:rPr lang="en-US" dirty="0" smtClean="0"/>
-              <a:t>Trivia </a:t>
-            </a:r>
-            <a:r>
-              <a:rPr lang="en-US" dirty="0" smtClean="0"/>
-              <a:t>Time</a:t>
+              <a:t>Trivia Time</a:t>
             </a:r>
           </a:p>
           <a:p>
@@ -16032,7 +16023,6 @@
               <a:rPr lang="en-US" dirty="0" smtClean="0"/>
               <a:t>Hybrid (a mix of both)</a:t>
             </a:r>
-            <a:endParaRPr lang="en-US" dirty="0" smtClean="0"/>
           </a:p>
           <a:p>
             <a:endParaRPr lang="en-US" dirty="0"/>
@@ -16242,7 +16232,6 @@
               <a:rPr lang="en-US" sz="2800" i="1" dirty="0" smtClean="0"/>
               <a:t>fat</a:t>
             </a:r>
-            <a:endParaRPr lang="en-US" sz="2800" i="1" dirty="0" smtClean="0"/>
           </a:p>
           <a:p>
             <a:pPr lvl="1"/>

</xml_diff>